<commit_message>
Case Study 2, Task 2 -> Use Case Diagrams.
</commit_message>
<xml_diff>
--- a/Project Pink/doc/task02/Presentation - CS Task 2.pptx
+++ b/Project Pink/doc/task02/Presentation - CS Task 2.pptx
@@ -1268,9 +1268,8 @@
           <a:bodyPr/>
           <a:lstStyle/>
           <a:p>
-            <a:fld id="{7D0065BE-0657-4A47-90AD-C21C55E16B19}" type="datetime4">
-              <a:rPr lang="en-US" smtClean="0"/>
-              <a:pPr/>
+            <a:fld id="{D2F5164E-5911-4298-AE04-8675B1931619}" type="datetime4">
+              <a:rPr lang="en-US" smtClean="0"/>
               <a:t>March 1, 2013</a:t>
             </a:fld>
             <a:endParaRPr lang="en-US"/>
@@ -1325,6 +1324,13 @@
   <p:clrMapOvr>
     <a:masterClrMapping/>
   </p:clrMapOvr>
+  <p:timing>
+    <p:tnLst>
+      <p:par>
+        <p:cTn id="1" dur="indefinite" restart="never" nodeType="tmRoot"/>
+      </p:par>
+    </p:tnLst>
+  </p:timing>
 </p:sldLayout>
 </file>
 
@@ -1435,9 +1441,8 @@
           <a:bodyPr/>
           <a:lstStyle/>
           <a:p>
-            <a:fld id="{A16C3AA4-67BE-44F7-809A-3582401494AF}" type="datetime4">
-              <a:rPr lang="en-US" smtClean="0"/>
-              <a:pPr/>
+            <a:fld id="{F5F85DD0-9DC8-425F-A743-92DF2E794843}" type="datetime4">
+              <a:rPr lang="en-US" smtClean="0"/>
               <a:t>March 1, 2013</a:t>
             </a:fld>
             <a:endParaRPr lang="en-US"/>
@@ -1612,9 +1617,8 @@
           <a:bodyPr/>
           <a:lstStyle/>
           <a:p>
-            <a:fld id="{25172EEB-1769-4776-AD69-E7C1260563EB}" type="datetime4">
-              <a:rPr lang="en-US" smtClean="0"/>
-              <a:pPr/>
+            <a:fld id="{09DB234A-86EE-4827-8BC8-5E8D4A5C61C2}" type="datetime4">
+              <a:rPr lang="en-US" smtClean="0"/>
               <a:t>March 1, 2013</a:t>
             </a:fld>
             <a:endParaRPr lang="en-US"/>
@@ -1779,12 +1783,11 @@
           <a:bodyPr/>
           <a:lstStyle/>
           <a:p>
-            <a:fld id="{D47BB8AF-C16A-4836-A92D-61834B5F0BA5}" type="datetime4">
-              <a:rPr lang="en-US" smtClean="0"/>
-              <a:pPr/>
+            <a:fld id="{5FC6E9E3-B99A-42D1-82F3-DE0DD34F4F88}" type="datetime4">
+              <a:rPr lang="en-US" smtClean="0"/>
               <a:t>March 1, 2013</a:t>
             </a:fld>
-            <a:endParaRPr lang="en-US"/>
+            <a:endParaRPr lang="en-US" dirty="0" smtClean="0"/>
           </a:p>
         </p:txBody>
       </p:sp>
@@ -1836,6 +1839,13 @@
   <p:clrMapOvr>
     <a:masterClrMapping/>
   </p:clrMapOvr>
+  <p:timing>
+    <p:tnLst>
+      <p:par>
+        <p:cTn id="1" dur="indefinite" restart="never" nodeType="tmRoot"/>
+      </p:par>
+    </p:tnLst>
+  </p:timing>
 </p:sldLayout>
 </file>
 
@@ -2334,9 +2344,8 @@
           <a:bodyPr/>
           <a:lstStyle/>
           <a:p>
-            <a:fld id="{647D2193-4505-4A75-99BB-880C6989A757}" type="datetime4">
-              <a:rPr lang="en-US" smtClean="0"/>
-              <a:pPr/>
+            <a:fld id="{A90FDDB8-780A-4C75-9CD0-B67B761D3BD6}" type="datetime4">
+              <a:rPr lang="en-US" smtClean="0"/>
               <a:t>March 1, 2013</a:t>
             </a:fld>
             <a:endParaRPr lang="en-US"/>
@@ -2391,6 +2400,13 @@
   <p:clrMapOvr>
     <a:masterClrMapping/>
   </p:clrMapOvr>
+  <p:timing>
+    <p:tnLst>
+      <p:par>
+        <p:cTn id="1" dur="indefinite" restart="never" nodeType="tmRoot"/>
+      </p:par>
+    </p:tnLst>
+  </p:timing>
 </p:sldLayout>
 </file>
 
@@ -2596,9 +2612,8 @@
           <a:bodyPr/>
           <a:lstStyle/>
           <a:p>
-            <a:fld id="{113A18F4-33C3-445B-924C-31108C51719C}" type="datetime4">
-              <a:rPr lang="en-US" smtClean="0"/>
-              <a:pPr/>
+            <a:fld id="{94CE2C26-9143-4031-AFDD-1D897A0CBABF}" type="datetime4">
+              <a:rPr lang="en-US" smtClean="0"/>
               <a:t>March 1, 2013</a:t>
             </a:fld>
             <a:endParaRPr lang="en-US"/>
@@ -3086,9 +3101,8 @@
           <a:bodyPr/>
           <a:lstStyle/>
           <a:p>
-            <a:fld id="{3AF7543A-E259-478F-9E0D-57BA40E442B7}" type="datetime4">
-              <a:rPr lang="en-US" smtClean="0"/>
-              <a:pPr/>
+            <a:fld id="{C78B18A2-27A2-47E6-9AA4-2C6E921AC2A5}" type="datetime4">
+              <a:rPr lang="en-US" smtClean="0"/>
               <a:t>March 1, 2013</a:t>
             </a:fld>
             <a:endParaRPr lang="en-US"/>
@@ -3201,9 +3215,8 @@
           <a:bodyPr/>
           <a:lstStyle/>
           <a:p>
-            <a:fld id="{1EFB012D-77A1-44B0-BB26-329BA1EE55C9}" type="datetime4">
-              <a:rPr lang="en-US" smtClean="0"/>
-              <a:pPr/>
+            <a:fld id="{A405655E-08E8-4D1A-90B5-93605D70570A}" type="datetime4">
+              <a:rPr lang="en-US" smtClean="0"/>
               <a:t>March 1, 2013</a:t>
             </a:fld>
             <a:endParaRPr lang="en-US"/>
@@ -3293,9 +3306,8 @@
           <a:bodyPr/>
           <a:lstStyle/>
           <a:p>
-            <a:fld id="{94B7499E-3031-413E-B01E-B94970708CAA}" type="datetime4">
-              <a:rPr lang="en-US" smtClean="0"/>
-              <a:pPr/>
+            <a:fld id="{AB2B32D0-B57F-4EBE-A398-7F7B522608A9}" type="datetime4">
+              <a:rPr lang="en-US" smtClean="0"/>
               <a:t>March 1, 2013</a:t>
             </a:fld>
             <a:endParaRPr lang="en-US"/>
@@ -3725,9 +3737,8 @@
           <a:bodyPr/>
           <a:lstStyle/>
           <a:p>
-            <a:fld id="{DC7EAB0C-2220-4D0E-A0DD-DB7FA0F742F4}" type="datetime4">
-              <a:rPr lang="en-US" smtClean="0"/>
-              <a:pPr/>
+            <a:fld id="{03FCC32F-8C9F-4738-9472-34E16ED64B67}" type="datetime4">
+              <a:rPr lang="en-US" smtClean="0"/>
               <a:t>March 1, 2013</a:t>
             </a:fld>
             <a:endParaRPr lang="en-US"/>
@@ -4256,9 +4267,8 @@
           <a:bodyPr/>
           <a:lstStyle/>
           <a:p>
-            <a:fld id="{E3416D63-31BF-4B94-B6C5-E20B2C63F515}" type="datetime4">
-              <a:rPr lang="en-US" smtClean="0"/>
-              <a:pPr/>
+            <a:fld id="{B0F7D898-3938-4433-B571-CFFDF23E65AB}" type="datetime4">
+              <a:rPr lang="en-US" smtClean="0"/>
               <a:t>March 1, 2013</a:t>
             </a:fld>
             <a:endParaRPr lang="en-US"/>
@@ -5098,9 +5108,8 @@
             </a:lvl1pPr>
           </a:lstStyle>
           <a:p>
-            <a:fld id="{62B1B13E-D5AF-485E-81A1-82A140076526}" type="datetime4">
-              <a:rPr lang="en-US" smtClean="0"/>
-              <a:pPr/>
+            <a:fld id="{AF9A9796-4B2A-479B-9B22-C4A8FD0211ED}" type="datetime4">
+              <a:rPr lang="en-US" smtClean="0"/>
               <a:t>March 1, 2013</a:t>
             </a:fld>
             <a:endParaRPr lang="en-US" dirty="0"/>
@@ -5205,7 +5214,14 @@
     <p:sldLayoutId id="2147483658" r:id="rId10"/>
     <p:sldLayoutId id="2147483659" r:id="rId11"/>
   </p:sldLayoutIdLst>
-  <p:hf sldNum="0" hdr="0" ftr="0" dt="0"/>
+  <p:timing>
+    <p:tnLst>
+      <p:par>
+        <p:cTn id="1" dur="indefinite" restart="never" nodeType="tmRoot"/>
+      </p:par>
+    </p:tnLst>
+  </p:timing>
+  <p:hf hdr="0" ftr="0"/>
   <p:txStyles>
     <p:titleStyle>
       <a:lvl1pPr algn="l" defTabSz="914400" rtl="0" eaLnBrk="1" latinLnBrk="0" hangingPunct="1">
@@ -5661,6 +5677,53 @@
           </a:p>
         </p:txBody>
       </p:sp>
+      <p:sp>
+        <p:nvSpPr>
+          <p:cNvPr id="4" name="Datumsplatzhalter 3"/>
+          <p:cNvSpPr>
+            <a:spLocks noGrp="1"/>
+          </p:cNvSpPr>
+          <p:nvPr>
+            <p:ph type="dt" sz="half" idx="10"/>
+          </p:nvPr>
+        </p:nvSpPr>
+        <p:spPr/>
+        <p:txBody>
+          <a:bodyPr/>
+          <a:lstStyle/>
+          <a:p>
+            <a:fld id="{E7DDC8A0-3CB3-433C-A1C9-7A8F1FEE3ABA}" type="datetime4">
+              <a:rPr lang="en-US" smtClean="0"/>
+              <a:t>March 1, 2013</a:t>
+            </a:fld>
+            <a:endParaRPr lang="en-US"/>
+          </a:p>
+        </p:txBody>
+      </p:sp>
+      <p:sp>
+        <p:nvSpPr>
+          <p:cNvPr id="5" name="Foliennummernplatzhalter 4"/>
+          <p:cNvSpPr>
+            <a:spLocks noGrp="1"/>
+          </p:cNvSpPr>
+          <p:nvPr>
+            <p:ph type="sldNum" sz="quarter" idx="12"/>
+          </p:nvPr>
+        </p:nvSpPr>
+        <p:spPr/>
+        <p:txBody>
+          <a:bodyPr/>
+          <a:lstStyle/>
+          <a:p>
+            <a:fld id="{2754ED01-E2A0-4C1E-8E21-014B99041579}" type="slidenum">
+              <a:rPr lang="en-US" smtClean="0"/>
+              <a:pPr/>
+              <a:t>2</a:t>
+            </a:fld>
+            <a:endParaRPr lang="en-US"/>
+          </a:p>
+        </p:txBody>
+      </p:sp>
     </p:spTree>
     <p:extLst>
       <p:ext uri="{BB962C8B-B14F-4D97-AF65-F5344CB8AC3E}">
@@ -5828,6 +5891,53 @@
           </a:p>
         </p:txBody>
       </p:sp>
+      <p:sp>
+        <p:nvSpPr>
+          <p:cNvPr id="3" name="Datumsplatzhalter 2"/>
+          <p:cNvSpPr>
+            <a:spLocks noGrp="1"/>
+          </p:cNvSpPr>
+          <p:nvPr>
+            <p:ph type="dt" sz="half" idx="10"/>
+          </p:nvPr>
+        </p:nvSpPr>
+        <p:spPr/>
+        <p:txBody>
+          <a:bodyPr/>
+          <a:lstStyle/>
+          <a:p>
+            <a:fld id="{F237CDBB-975C-405E-98BC-9437C590AB69}" type="datetime4">
+              <a:rPr lang="en-US" smtClean="0"/>
+              <a:t>March 1, 2013</a:t>
+            </a:fld>
+            <a:endParaRPr lang="en-US"/>
+          </a:p>
+        </p:txBody>
+      </p:sp>
+      <p:sp>
+        <p:nvSpPr>
+          <p:cNvPr id="5" name="Foliennummernplatzhalter 4"/>
+          <p:cNvSpPr>
+            <a:spLocks noGrp="1"/>
+          </p:cNvSpPr>
+          <p:nvPr>
+            <p:ph type="sldNum" sz="quarter" idx="12"/>
+          </p:nvPr>
+        </p:nvSpPr>
+        <p:spPr/>
+        <p:txBody>
+          <a:bodyPr/>
+          <a:lstStyle/>
+          <a:p>
+            <a:fld id="{2754ED01-E2A0-4C1E-8E21-014B99041579}" type="slidenum">
+              <a:rPr lang="en-US" smtClean="0"/>
+              <a:pPr/>
+              <a:t>3</a:t>
+            </a:fld>
+            <a:endParaRPr lang="en-US"/>
+          </a:p>
+        </p:txBody>
+      </p:sp>
     </p:spTree>
     <p:extLst>
       <p:ext uri="{BB962C8B-B14F-4D97-AF65-F5344CB8AC3E}">
@@ -5904,10 +6014,57 @@
           <a:lstStyle/>
           <a:p>
             <a:r>
-              <a:rPr lang="en-US" smtClean="0"/>
+              <a:rPr lang="en-US" dirty="0" smtClean="0"/>
               <a:t>Project Process</a:t>
             </a:r>
             <a:endParaRPr lang="en-US" dirty="0"/>
+          </a:p>
+        </p:txBody>
+      </p:sp>
+      <p:sp>
+        <p:nvSpPr>
+          <p:cNvPr id="2" name="Datumsplatzhalter 1"/>
+          <p:cNvSpPr>
+            <a:spLocks noGrp="1"/>
+          </p:cNvSpPr>
+          <p:nvPr>
+            <p:ph type="dt" sz="half" idx="10"/>
+          </p:nvPr>
+        </p:nvSpPr>
+        <p:spPr/>
+        <p:txBody>
+          <a:bodyPr/>
+          <a:lstStyle/>
+          <a:p>
+            <a:fld id="{9A0872BD-10EE-4D27-92A8-0AE7567A40D1}" type="datetime4">
+              <a:rPr lang="en-US" smtClean="0"/>
+              <a:t>March 1, 2013</a:t>
+            </a:fld>
+            <a:endParaRPr lang="en-US"/>
+          </a:p>
+        </p:txBody>
+      </p:sp>
+      <p:sp>
+        <p:nvSpPr>
+          <p:cNvPr id="3" name="Foliennummernplatzhalter 2"/>
+          <p:cNvSpPr>
+            <a:spLocks noGrp="1"/>
+          </p:cNvSpPr>
+          <p:nvPr>
+            <p:ph type="sldNum" sz="quarter" idx="12"/>
+          </p:nvPr>
+        </p:nvSpPr>
+        <p:spPr/>
+        <p:txBody>
+          <a:bodyPr/>
+          <a:lstStyle/>
+          <a:p>
+            <a:fld id="{2754ED01-E2A0-4C1E-8E21-014B99041579}" type="slidenum">
+              <a:rPr lang="en-US" smtClean="0"/>
+              <a:pPr/>
+              <a:t>4</a:t>
+            </a:fld>
+            <a:endParaRPr lang="en-US"/>
           </a:p>
         </p:txBody>
       </p:sp>
@@ -5948,34 +6105,11 @@
           <a:chExt cx="0" cy="0"/>
         </a:xfrm>
       </p:grpSpPr>
-      <p:sp>
-        <p:nvSpPr>
-          <p:cNvPr id="2" name="Title 1"/>
-          <p:cNvSpPr>
-            <a:spLocks noGrp="1"/>
-          </p:cNvSpPr>
-          <p:nvPr>
-            <p:ph type="title"/>
-          </p:nvPr>
-        </p:nvSpPr>
-        <p:spPr/>
-        <p:txBody>
-          <a:bodyPr/>
-          <a:lstStyle/>
-          <a:p>
-            <a:r>
-              <a:rPr lang="en-US" dirty="0" smtClean="0"/>
-              <a:t>Process</a:t>
-            </a:r>
-            <a:endParaRPr lang="en-US" dirty="0"/>
-          </a:p>
-        </p:txBody>
-      </p:sp>
       <p:pic>
         <p:nvPicPr>
-          <p:cNvPr id="3" name="Grafik 2"/>
+          <p:cNvPr id="3074" name="Picture 2" descr="C:\GIT\Pink\Project Pink\doc\task02\process.png"/>
           <p:cNvPicPr>
-            <a:picLocks noChangeAspect="1"/>
+            <a:picLocks noChangeAspect="1" noChangeArrowheads="1"/>
           </p:cNvPicPr>
           <p:nvPr/>
         </p:nvPicPr>
@@ -5987,20 +6121,78 @@
               </a:ext>
             </a:extLst>
           </a:blip>
+          <a:srcRect/>
           <a:stretch>
             <a:fillRect/>
           </a:stretch>
         </p:blipFill>
-        <p:spPr>
+        <p:spPr bwMode="auto">
           <a:xfrm>
-            <a:off x="564221" y="9525"/>
-            <a:ext cx="8069952" cy="7105650"/>
+            <a:off x="631825" y="-53975"/>
+            <a:ext cx="7878763" cy="7461250"/>
           </a:xfrm>
           <a:prstGeom prst="rect">
             <a:avLst/>
           </a:prstGeom>
+          <a:noFill/>
+          <a:extLst>
+            <a:ext uri="{909E8E84-426E-40DD-AFC4-6F175D3DCCD1}">
+              <a14:hiddenFill xmlns:a14="http://schemas.microsoft.com/office/drawing/2010/main">
+                <a:solidFill>
+                  <a:srgbClr val="FFFFFF"/>
+                </a:solidFill>
+              </a14:hiddenFill>
+            </a:ext>
+          </a:extLst>
         </p:spPr>
       </p:pic>
+      <p:sp>
+        <p:nvSpPr>
+          <p:cNvPr id="5" name="Datumsplatzhalter 4"/>
+          <p:cNvSpPr>
+            <a:spLocks noGrp="1"/>
+          </p:cNvSpPr>
+          <p:nvPr>
+            <p:ph type="dt" sz="half" idx="10"/>
+          </p:nvPr>
+        </p:nvSpPr>
+        <p:spPr/>
+        <p:txBody>
+          <a:bodyPr/>
+          <a:lstStyle/>
+          <a:p>
+            <a:fld id="{700FFFB0-685C-4CB2-89D0-43FD6FE67158}" type="datetime4">
+              <a:rPr lang="en-US" smtClean="0"/>
+              <a:t>March 1, 2013</a:t>
+            </a:fld>
+            <a:endParaRPr lang="en-US" dirty="0" smtClean="0"/>
+          </a:p>
+        </p:txBody>
+      </p:sp>
+      <p:sp>
+        <p:nvSpPr>
+          <p:cNvPr id="6" name="Foliennummernplatzhalter 5"/>
+          <p:cNvSpPr>
+            <a:spLocks noGrp="1"/>
+          </p:cNvSpPr>
+          <p:nvPr>
+            <p:ph type="sldNum" sz="quarter" idx="12"/>
+          </p:nvPr>
+        </p:nvSpPr>
+        <p:spPr/>
+        <p:txBody>
+          <a:bodyPr/>
+          <a:lstStyle/>
+          <a:p>
+            <a:fld id="{2754ED01-E2A0-4C1E-8E21-014B99041579}" type="slidenum">
+              <a:rPr lang="en-US" smtClean="0"/>
+              <a:pPr/>
+              <a:t>5</a:t>
+            </a:fld>
+            <a:endParaRPr lang="en-US"/>
+          </a:p>
+        </p:txBody>
+      </p:sp>
     </p:spTree>
     <p:extLst>
       <p:ext uri="{BB962C8B-B14F-4D97-AF65-F5344CB8AC3E}">
@@ -6038,9 +6230,28 @@
           <a:chExt cx="0" cy="0"/>
         </a:xfrm>
       </p:grpSpPr>
+      <p:sp>
+        <p:nvSpPr>
+          <p:cNvPr id="3" name="Titel 2"/>
+          <p:cNvSpPr>
+            <a:spLocks noGrp="1"/>
+          </p:cNvSpPr>
+          <p:nvPr>
+            <p:ph type="title"/>
+          </p:nvPr>
+        </p:nvSpPr>
+        <p:spPr/>
+        <p:txBody>
+          <a:bodyPr/>
+          <a:lstStyle/>
+          <a:p>
+            <a:endParaRPr lang="de-CH"/>
+          </a:p>
+        </p:txBody>
+      </p:sp>
       <p:pic>
         <p:nvPicPr>
-          <p:cNvPr id="1026" name="Picture 2"/>
+          <p:cNvPr id="1027" name="Picture 3"/>
           <p:cNvPicPr>
             <a:picLocks noChangeAspect="1" noChangeArrowheads="1"/>
           </p:cNvPicPr>
@@ -6061,8 +6272,8 @@
         </p:blipFill>
         <p:spPr bwMode="auto">
           <a:xfrm>
-            <a:off x="2057400" y="-1712064"/>
-            <a:ext cx="5262563" cy="7312764"/>
+            <a:off x="2057718" y="0"/>
+            <a:ext cx="5295582" cy="6014022"/>
           </a:xfrm>
           <a:prstGeom prst="rect">
             <a:avLst/>
@@ -6094,12 +6305,12 @@
       </p:pic>
       <p:sp>
         <p:nvSpPr>
-          <p:cNvPr id="3" name="Titel 2"/>
-          <p:cNvSpPr>
-            <a:spLocks noGrp="1"/>
-          </p:cNvSpPr>
-          <p:nvPr>
-            <p:ph type="title"/>
+          <p:cNvPr id="5" name="Datumsplatzhalter 4"/>
+          <p:cNvSpPr>
+            <a:spLocks noGrp="1"/>
+          </p:cNvSpPr>
+          <p:nvPr>
+            <p:ph type="dt" sz="half" idx="10"/>
           </p:nvPr>
         </p:nvSpPr>
         <p:spPr/>
@@ -6107,7 +6318,35 @@
           <a:bodyPr/>
           <a:lstStyle/>
           <a:p>
-            <a:endParaRPr lang="de-CH"/>
+            <a:fld id="{DE9ADF86-9C52-40E0-85F7-6F647782A137}" type="datetime4">
+              <a:rPr lang="en-US" smtClean="0"/>
+              <a:t>March 1, 2013</a:t>
+            </a:fld>
+            <a:endParaRPr lang="en-US" dirty="0" smtClean="0"/>
+          </a:p>
+        </p:txBody>
+      </p:sp>
+      <p:sp>
+        <p:nvSpPr>
+          <p:cNvPr id="6" name="Foliennummernplatzhalter 5"/>
+          <p:cNvSpPr>
+            <a:spLocks noGrp="1"/>
+          </p:cNvSpPr>
+          <p:nvPr>
+            <p:ph type="sldNum" sz="quarter" idx="12"/>
+          </p:nvPr>
+        </p:nvSpPr>
+        <p:spPr/>
+        <p:txBody>
+          <a:bodyPr/>
+          <a:lstStyle/>
+          <a:p>
+            <a:fld id="{2754ED01-E2A0-4C1E-8E21-014B99041579}" type="slidenum">
+              <a:rPr lang="en-US" smtClean="0"/>
+              <a:pPr/>
+              <a:t>6</a:t>
+            </a:fld>
+            <a:endParaRPr lang="en-US"/>
           </a:p>
         </p:txBody>
       </p:sp>
@@ -6148,28 +6387,9 @@
           <a:chExt cx="0" cy="0"/>
         </a:xfrm>
       </p:grpSpPr>
-      <p:sp>
-        <p:nvSpPr>
-          <p:cNvPr id="3" name="Titel 2"/>
-          <p:cNvSpPr>
-            <a:spLocks noGrp="1"/>
-          </p:cNvSpPr>
-          <p:nvPr>
-            <p:ph type="title"/>
-          </p:nvPr>
-        </p:nvSpPr>
-        <p:spPr/>
-        <p:txBody>
-          <a:bodyPr/>
-          <a:lstStyle/>
-          <a:p>
-            <a:endParaRPr lang="de-CH"/>
-          </a:p>
-        </p:txBody>
-      </p:sp>
       <p:pic>
         <p:nvPicPr>
-          <p:cNvPr id="2050" name="Picture 2"/>
+          <p:cNvPr id="2051" name="Picture 3"/>
           <p:cNvPicPr>
             <a:picLocks noChangeAspect="1" noChangeArrowheads="1"/>
           </p:cNvPicPr>
@@ -6190,8 +6410,8 @@
         </p:blipFill>
         <p:spPr bwMode="auto">
           <a:xfrm>
-            <a:off x="2047874" y="-95251"/>
-            <a:ext cx="5038725" cy="5452867"/>
+            <a:off x="2067604" y="-99990"/>
+            <a:ext cx="5616088" cy="6124838"/>
           </a:xfrm>
           <a:prstGeom prst="rect">
             <a:avLst/>
@@ -6221,6 +6441,53 @@
           </a:extLst>
         </p:spPr>
       </p:pic>
+      <p:sp>
+        <p:nvSpPr>
+          <p:cNvPr id="2" name="Datumsplatzhalter 1"/>
+          <p:cNvSpPr>
+            <a:spLocks noGrp="1"/>
+          </p:cNvSpPr>
+          <p:nvPr>
+            <p:ph type="dt" sz="half" idx="10"/>
+          </p:nvPr>
+        </p:nvSpPr>
+        <p:spPr/>
+        <p:txBody>
+          <a:bodyPr/>
+          <a:lstStyle/>
+          <a:p>
+            <a:fld id="{8F9A181E-C8F9-4CA2-B7B4-1B7F04C28ED9}" type="datetime4">
+              <a:rPr lang="en-US" smtClean="0"/>
+              <a:t>March 1, 2013</a:t>
+            </a:fld>
+            <a:endParaRPr lang="en-US" dirty="0" smtClean="0"/>
+          </a:p>
+        </p:txBody>
+      </p:sp>
+      <p:sp>
+        <p:nvSpPr>
+          <p:cNvPr id="4" name="Foliennummernplatzhalter 3"/>
+          <p:cNvSpPr>
+            <a:spLocks noGrp="1"/>
+          </p:cNvSpPr>
+          <p:nvPr>
+            <p:ph type="sldNum" sz="quarter" idx="12"/>
+          </p:nvPr>
+        </p:nvSpPr>
+        <p:spPr/>
+        <p:txBody>
+          <a:bodyPr/>
+          <a:lstStyle/>
+          <a:p>
+            <a:fld id="{2754ED01-E2A0-4C1E-8E21-014B99041579}" type="slidenum">
+              <a:rPr lang="en-US" smtClean="0"/>
+              <a:pPr/>
+              <a:t>7</a:t>
+            </a:fld>
+            <a:endParaRPr lang="en-US"/>
+          </a:p>
+        </p:txBody>
+      </p:sp>
     </p:spTree>
     <p:extLst>
       <p:ext uri="{BB962C8B-B14F-4D97-AF65-F5344CB8AC3E}">

</xml_diff>